<commit_message>
TestBench class, no more templates
</commit_message>
<xml_diff>
--- a/WpfControlTestbench.pptx
+++ b/WpfControlTestbench.pptx
@@ -292,7 +292,7 @@
             <a:fld id="{1D8BD707-D9CF-40AE-B4C6-C98DA3205C09}" type="datetimeFigureOut">
               <a:rPr lang="en-US" smtClean="0"/>
               <a:pPr/>
-              <a:t>8/12/2014</a:t>
+              <a:t>2/27/2022</a:t>
             </a:fld>
             <a:endParaRPr lang="en-US"/>
           </a:p>
@@ -459,7 +459,7 @@
             <a:fld id="{1D8BD707-D9CF-40AE-B4C6-C98DA3205C09}" type="datetimeFigureOut">
               <a:rPr lang="en-US" smtClean="0"/>
               <a:pPr/>
-              <a:t>8/12/2014</a:t>
+              <a:t>2/27/2022</a:t>
             </a:fld>
             <a:endParaRPr lang="en-US"/>
           </a:p>
@@ -636,7 +636,7 @@
             <a:fld id="{1D8BD707-D9CF-40AE-B4C6-C98DA3205C09}" type="datetimeFigureOut">
               <a:rPr lang="en-US" smtClean="0"/>
               <a:pPr/>
-              <a:t>8/12/2014</a:t>
+              <a:t>2/27/2022</a:t>
             </a:fld>
             <a:endParaRPr lang="en-US"/>
           </a:p>
@@ -803,7 +803,7 @@
             <a:fld id="{1D8BD707-D9CF-40AE-B4C6-C98DA3205C09}" type="datetimeFigureOut">
               <a:rPr lang="en-US" smtClean="0"/>
               <a:pPr/>
-              <a:t>8/12/2014</a:t>
+              <a:t>2/27/2022</a:t>
             </a:fld>
             <a:endParaRPr lang="en-US"/>
           </a:p>
@@ -1046,7 +1046,7 @@
             <a:fld id="{1D8BD707-D9CF-40AE-B4C6-C98DA3205C09}" type="datetimeFigureOut">
               <a:rPr lang="en-US" smtClean="0"/>
               <a:pPr/>
-              <a:t>8/12/2014</a:t>
+              <a:t>2/27/2022</a:t>
             </a:fld>
             <a:endParaRPr lang="en-US"/>
           </a:p>
@@ -1331,7 +1331,7 @@
             <a:fld id="{1D8BD707-D9CF-40AE-B4C6-C98DA3205C09}" type="datetimeFigureOut">
               <a:rPr lang="en-US" smtClean="0"/>
               <a:pPr/>
-              <a:t>8/12/2014</a:t>
+              <a:t>2/27/2022</a:t>
             </a:fld>
             <a:endParaRPr lang="en-US"/>
           </a:p>
@@ -1750,7 +1750,7 @@
             <a:fld id="{1D8BD707-D9CF-40AE-B4C6-C98DA3205C09}" type="datetimeFigureOut">
               <a:rPr lang="en-US" smtClean="0"/>
               <a:pPr/>
-              <a:t>8/12/2014</a:t>
+              <a:t>2/27/2022</a:t>
             </a:fld>
             <a:endParaRPr lang="en-US"/>
           </a:p>
@@ -1865,7 +1865,7 @@
             <a:fld id="{1D8BD707-D9CF-40AE-B4C6-C98DA3205C09}" type="datetimeFigureOut">
               <a:rPr lang="en-US" smtClean="0"/>
               <a:pPr/>
-              <a:t>8/12/2014</a:t>
+              <a:t>2/27/2022</a:t>
             </a:fld>
             <a:endParaRPr lang="en-US"/>
           </a:p>
@@ -1957,7 +1957,7 @@
             <a:fld id="{1D8BD707-D9CF-40AE-B4C6-C98DA3205C09}" type="datetimeFigureOut">
               <a:rPr lang="en-US" smtClean="0"/>
               <a:pPr/>
-              <a:t>8/12/2014</a:t>
+              <a:t>2/27/2022</a:t>
             </a:fld>
             <a:endParaRPr lang="en-US"/>
           </a:p>
@@ -2231,7 +2231,7 @@
             <a:fld id="{1D8BD707-D9CF-40AE-B4C6-C98DA3205C09}" type="datetimeFigureOut">
               <a:rPr lang="en-US" smtClean="0"/>
               <a:pPr/>
-              <a:t>8/12/2014</a:t>
+              <a:t>2/27/2022</a:t>
             </a:fld>
             <a:endParaRPr lang="en-US"/>
           </a:p>
@@ -2481,7 +2481,7 @@
             <a:fld id="{1D8BD707-D9CF-40AE-B4C6-C98DA3205C09}" type="datetimeFigureOut">
               <a:rPr lang="en-US" smtClean="0"/>
               <a:pPr/>
-              <a:t>8/12/2014</a:t>
+              <a:t>2/27/2022</a:t>
             </a:fld>
             <a:endParaRPr lang="en-US"/>
           </a:p>
@@ -2691,7 +2691,7 @@
             <a:fld id="{1D8BD707-D9CF-40AE-B4C6-C98DA3205C09}" type="datetimeFigureOut">
               <a:rPr lang="en-US" smtClean="0"/>
               <a:pPr/>
-              <a:t>8/12/2014</a:t>
+              <a:t>2/27/2022</a:t>
             </a:fld>
             <a:endParaRPr lang="en-US"/>
           </a:p>
@@ -4253,6 +4253,253 @@
           </a:p>
         </p:txBody>
       </p:sp>
+      <p:sp>
+        <p:nvSpPr>
+          <p:cNvPr id="2" name="TextBox 1"/>
+          <p:cNvSpPr txBox="1"/>
+          <p:nvPr/>
+        </p:nvSpPr>
+        <p:spPr>
+          <a:xfrm>
+            <a:off x="304800" y="457200"/>
+            <a:ext cx="6400800" cy="4724400"/>
+          </a:xfrm>
+          <a:prstGeom prst="rect">
+            <a:avLst/>
+          </a:prstGeom>
+        </p:spPr>
+        <p:style>
+          <a:lnRef idx="1">
+            <a:schemeClr val="dk1"/>
+          </a:lnRef>
+          <a:fillRef idx="2">
+            <a:schemeClr val="dk1"/>
+          </a:fillRef>
+          <a:effectRef idx="1">
+            <a:schemeClr val="dk1"/>
+          </a:effectRef>
+          <a:fontRef idx="minor">
+            <a:schemeClr val="dk1"/>
+          </a:fontRef>
+        </p:style>
+        <p:txBody>
+          <a:bodyPr wrap="none" rtlCol="0">
+            <a:noAutofit/>
+          </a:bodyPr>
+          <a:lstStyle/>
+          <a:p>
+            <a:r>
+              <a:rPr lang="en-SG" sz="1200" b="1" dirty="0" err="1" smtClean="0"/>
+              <a:t>YourControlTestWindow</a:t>
+            </a:r>
+            <a:r>
+              <a:rPr lang="en-SG" sz="1200" b="1" dirty="0" smtClean="0"/>
+              <a:t>: </a:t>
+            </a:r>
+            <a:r>
+              <a:rPr lang="en-SG" sz="1200" b="1" dirty="0" err="1" smtClean="0"/>
+              <a:t>TestbenchWindow</a:t>
+            </a:r>
+            <a:endParaRPr lang="en-SG" sz="1200" b="1" dirty="0" smtClean="0"/>
+          </a:p>
+          <a:p>
+            <a:endParaRPr lang="en-SG" sz="1200" dirty="0"/>
+          </a:p>
+        </p:txBody>
+      </p:sp>
+      <p:sp>
+        <p:nvSpPr>
+          <p:cNvPr id="4" name="TextBox 3"/>
+          <p:cNvSpPr txBox="1"/>
+          <p:nvPr/>
+        </p:nvSpPr>
+        <p:spPr>
+          <a:xfrm>
+            <a:off x="457200" y="762000"/>
+            <a:ext cx="6400800" cy="4724400"/>
+          </a:xfrm>
+          <a:prstGeom prst="rect">
+            <a:avLst/>
+          </a:prstGeom>
+        </p:spPr>
+        <p:style>
+          <a:lnRef idx="1">
+            <a:schemeClr val="dk1"/>
+          </a:lnRef>
+          <a:fillRef idx="2">
+            <a:schemeClr val="dk1"/>
+          </a:fillRef>
+          <a:effectRef idx="1">
+            <a:schemeClr val="dk1"/>
+          </a:effectRef>
+          <a:fontRef idx="minor">
+            <a:schemeClr val="dk1"/>
+          </a:fontRef>
+        </p:style>
+        <p:txBody>
+          <a:bodyPr wrap="none" rtlCol="0">
+            <a:noAutofit/>
+          </a:bodyPr>
+          <a:lstStyle/>
+          <a:p>
+            <a:r>
+              <a:rPr lang="en-SG" sz="1200" b="1" dirty="0" err="1" smtClean="0"/>
+              <a:t>Testbench</a:t>
+            </a:r>
+            <a:endParaRPr lang="en-SG" sz="1200" b="1" dirty="0" smtClean="0"/>
+          </a:p>
+          <a:p>
+            <a:r>
+              <a:rPr lang="en-SG" sz="1200" dirty="0" smtClean="0"/>
+              <a:t>  </a:t>
+            </a:r>
+            <a:r>
+              <a:rPr lang="en-SG" sz="1200" dirty="0" err="1" smtClean="0"/>
+              <a:t>TestProperties</a:t>
+            </a:r>
+            <a:endParaRPr lang="en-SG" sz="1200" dirty="0" smtClean="0"/>
+          </a:p>
+          <a:p>
+            <a:r>
+              <a:rPr lang="en-SG" sz="1200" dirty="0" smtClean="0"/>
+              <a:t>  </a:t>
+            </a:r>
+            <a:r>
+              <a:rPr lang="en-SG" sz="1200" dirty="0" err="1" smtClean="0"/>
+              <a:t>standardPropertyViewer</a:t>
+            </a:r>
+            <a:endParaRPr lang="en-SG" sz="1200" dirty="0" smtClean="0"/>
+          </a:p>
+          <a:p>
+            <a:r>
+              <a:rPr lang="en-SG" sz="1200" dirty="0"/>
+              <a:t> </a:t>
+            </a:r>
+            <a:r>
+              <a:rPr lang="en-SG" sz="1200" dirty="0" smtClean="0"/>
+              <a:t> </a:t>
+            </a:r>
+            <a:r>
+              <a:rPr lang="en-SG" sz="1200" dirty="0" err="1"/>
+              <a:t>testControlContainer</a:t>
+            </a:r>
+            <a:endParaRPr lang="en-SG" sz="1200" dirty="0" smtClean="0"/>
+          </a:p>
+          <a:p>
+            <a:r>
+              <a:rPr lang="en-SG" sz="1200" dirty="0" smtClean="0"/>
+              <a:t>    </a:t>
+            </a:r>
+            <a:r>
+              <a:rPr lang="en-SG" sz="1200" dirty="0" err="1" smtClean="0"/>
+              <a:t>TestControl</a:t>
+            </a:r>
+            <a:endParaRPr lang="en-SG" sz="1200" dirty="0"/>
+          </a:p>
+          <a:p>
+            <a:endParaRPr lang="en-SG" sz="1200" dirty="0" smtClean="0"/>
+          </a:p>
+          <a:p>
+            <a:r>
+              <a:rPr lang="en-SG" sz="1200" dirty="0" smtClean="0"/>
+              <a:t> </a:t>
+            </a:r>
+            <a:endParaRPr lang="en-SG" sz="1200" dirty="0"/>
+          </a:p>
+          <a:p>
+            <a:endParaRPr lang="en-SG" sz="1200" dirty="0"/>
+          </a:p>
+        </p:txBody>
+      </p:sp>
+      <p:sp>
+        <p:nvSpPr>
+          <p:cNvPr id="5" name="Rectangle 1"/>
+          <p:cNvSpPr>
+            <a:spLocks noChangeArrowheads="1"/>
+          </p:cNvSpPr>
+          <p:nvPr/>
+        </p:nvSpPr>
+        <p:spPr bwMode="auto">
+          <a:xfrm>
+            <a:off x="1638300" y="3284538"/>
+            <a:ext cx="9144000" cy="457200"/>
+          </a:xfrm>
+          <a:prstGeom prst="rect">
+            <a:avLst/>
+          </a:prstGeom>
+          <a:noFill/>
+          <a:ln>
+            <a:noFill/>
+          </a:ln>
+          <a:effectLst/>
+          <a:extLst>
+            <a:ext uri="{909E8E84-426E-40DD-AFC4-6F175D3DCCD1}">
+              <a14:hiddenFill xmlns:a14="http://schemas.microsoft.com/office/drawing/2010/main">
+                <a:solidFill>
+                  <a:schemeClr val="accent1"/>
+                </a:solidFill>
+              </a14:hiddenFill>
+            </a:ext>
+            <a:ext uri="{91240B29-F687-4F45-9708-019B960494DF}">
+              <a14:hiddenLine xmlns:a14="http://schemas.microsoft.com/office/drawing/2010/main" w="9525">
+                <a:solidFill>
+                  <a:schemeClr val="tx1"/>
+                </a:solidFill>
+                <a:miter lim="800000"/>
+                <a:headEnd/>
+                <a:tailEnd/>
+              </a14:hiddenLine>
+            </a:ext>
+            <a:ext uri="{AF507438-7753-43E0-B8FC-AC1667EBCBE1}">
+              <a14:hiddenEffects xmlns:a14="http://schemas.microsoft.com/office/drawing/2010/main">
+                <a:effectLst>
+                  <a:outerShdw dist="35921" dir="2700000" algn="ctr" rotWithShape="0">
+                    <a:schemeClr val="bg2"/>
+                  </a:outerShdw>
+                </a:effectLst>
+              </a14:hiddenEffects>
+            </a:ext>
+          </a:extLst>
+        </p:spPr>
+        <p:txBody>
+          <a:bodyPr vert="horz" wrap="none" lIns="91440" tIns="45720" rIns="91440" bIns="45720" numCol="1" anchor="ctr" anchorCtr="0" compatLnSpc="1">
+            <a:prstTxWarp prst="textNoShape">
+              <a:avLst/>
+            </a:prstTxWarp>
+            <a:spAutoFit/>
+          </a:bodyPr>
+          <a:lstStyle/>
+          <a:p>
+            <a:pPr marL="0" marR="0" lvl="0" indent="0" algn="l" defTabSz="914400" rtl="0" eaLnBrk="1" fontAlgn="base" latinLnBrk="0" hangingPunct="1">
+              <a:lnSpc>
+                <a:spcPct val="100000"/>
+              </a:lnSpc>
+              <a:spcBef>
+                <a:spcPct val="0"/>
+              </a:spcBef>
+              <a:spcAft>
+                <a:spcPct val="0"/>
+              </a:spcAft>
+              <a:buClrTx/>
+              <a:buSzTx/>
+              <a:buFontTx/>
+              <a:buNone/>
+              <a:tabLst/>
+            </a:pPr>
+            <a:endParaRPr kumimoji="0" lang="en-US" altLang="en-US" sz="1800" b="0" i="0" u="none" strike="noStrike" cap="none" normalizeH="0" baseline="0" smtClean="0">
+              <a:ln>
+                <a:noFill/>
+              </a:ln>
+              <a:solidFill>
+                <a:schemeClr val="tx1"/>
+              </a:solidFill>
+              <a:effectLst/>
+              <a:latin typeface="Arial" pitchFamily="34" charset="0"/>
+              <a:cs typeface="Arial" pitchFamily="34" charset="0"/>
+            </a:endParaRPr>
+          </a:p>
+        </p:txBody>
+      </p:sp>
     </p:spTree>
     <p:extLst>
       <p:ext uri="{BB962C8B-B14F-4D97-AF65-F5344CB8AC3E}">

</xml_diff>